<commit_message>
feat : first iteration, user stories and DUC : Begin PPTX and documentation
</commit_message>
<xml_diff>
--- a/Presentation_olvier_MOREL.pptx
+++ b/Presentation_olvier_MOREL.pptx
@@ -4,8 +4,16 @@
   <p:sldMasterIdLst>
     <p:sldMasterId id="2147483648" r:id="rId1"/>
   </p:sldMasterIdLst>
+  <p:notesMasterIdLst>
+    <p:notesMasterId r:id="rId8"/>
+  </p:notesMasterIdLst>
   <p:sldIdLst>
     <p:sldId id="256" r:id="rId2"/>
+    <p:sldId id="259" r:id="rId3"/>
+    <p:sldId id="257" r:id="rId4"/>
+    <p:sldId id="258" r:id="rId5"/>
+    <p:sldId id="260" r:id="rId6"/>
+    <p:sldId id="261" r:id="rId7"/>
   </p:sldIdLst>
   <p:sldSz cx="12192000" cy="6858000"/>
   <p:notesSz cx="6858000" cy="9144000"/>
@@ -104,7 +112,361 @@
       </a:defRPr>
     </a:lvl9pPr>
   </p:defaultTextStyle>
+  <p:extLst>
+    <p:ext uri="{EFAFB233-063F-42B5-8137-9DF3F51BA10A}">
+      <p15:sldGuideLst xmlns:p15="http://schemas.microsoft.com/office/powerpoint/2012/main"/>
+    </p:ext>
+  </p:extLst>
 </p:presentation>
+</file>
+
+<file path=ppt/notesMasters/notesMaster1.xml><?xml version="1.0" encoding="utf-8"?>
+<p:notesMaster xmlns:a="http://schemas.openxmlformats.org/drawingml/2006/main" xmlns:r="http://schemas.openxmlformats.org/officeDocument/2006/relationships" xmlns:p="http://schemas.openxmlformats.org/presentationml/2006/main">
+  <p:cSld>
+    <p:bg>
+      <p:bgRef idx="1001">
+        <a:schemeClr val="bg1"/>
+      </p:bgRef>
+    </p:bg>
+    <p:spTree>
+      <p:nvGrpSpPr>
+        <p:cNvPr id="1" name=""/>
+        <p:cNvGrpSpPr/>
+        <p:nvPr/>
+      </p:nvGrpSpPr>
+      <p:grpSpPr>
+        <a:xfrm>
+          <a:off x="0" y="0"/>
+          <a:ext cx="0" cy="0"/>
+          <a:chOff x="0" y="0"/>
+          <a:chExt cx="0" cy="0"/>
+        </a:xfrm>
+      </p:grpSpPr>
+      <p:sp>
+        <p:nvSpPr>
+          <p:cNvPr id="2" name="Espace réservé de l'en-tête 1"/>
+          <p:cNvSpPr>
+            <a:spLocks noGrp="1"/>
+          </p:cNvSpPr>
+          <p:nvPr>
+            <p:ph type="hdr" sz="quarter"/>
+          </p:nvPr>
+        </p:nvSpPr>
+        <p:spPr>
+          <a:xfrm>
+            <a:off x="0" y="0"/>
+            <a:ext cx="2971800" cy="458788"/>
+          </a:xfrm>
+          <a:prstGeom prst="rect">
+            <a:avLst/>
+          </a:prstGeom>
+        </p:spPr>
+        <p:txBody>
+          <a:bodyPr vert="horz" lIns="91440" tIns="45720" rIns="91440" bIns="45720" rtlCol="0"/>
+          <a:lstStyle>
+            <a:lvl1pPr algn="l">
+              <a:defRPr sz="1200"/>
+            </a:lvl1pPr>
+          </a:lstStyle>
+          <a:p>
+            <a:endParaRPr lang="fr-FR"/>
+          </a:p>
+        </p:txBody>
+      </p:sp>
+      <p:sp>
+        <p:nvSpPr>
+          <p:cNvPr id="3" name="Espace réservé de la date 2"/>
+          <p:cNvSpPr>
+            <a:spLocks noGrp="1"/>
+          </p:cNvSpPr>
+          <p:nvPr>
+            <p:ph type="dt" idx="1"/>
+          </p:nvPr>
+        </p:nvSpPr>
+        <p:spPr>
+          <a:xfrm>
+            <a:off x="3884613" y="0"/>
+            <a:ext cx="2971800" cy="458788"/>
+          </a:xfrm>
+          <a:prstGeom prst="rect">
+            <a:avLst/>
+          </a:prstGeom>
+        </p:spPr>
+        <p:txBody>
+          <a:bodyPr vert="horz" lIns="91440" tIns="45720" rIns="91440" bIns="45720" rtlCol="0"/>
+          <a:lstStyle>
+            <a:lvl1pPr algn="r">
+              <a:defRPr sz="1200"/>
+            </a:lvl1pPr>
+          </a:lstStyle>
+          <a:p>
+            <a:fld id="{E8FCC5B4-5461-4D35-B47E-4EAC3B164469}" type="datetimeFigureOut">
+              <a:rPr lang="fr-FR" smtClean="0"/>
+              <a:t>23/08/2021</a:t>
+            </a:fld>
+            <a:endParaRPr lang="fr-FR"/>
+          </a:p>
+        </p:txBody>
+      </p:sp>
+      <p:sp>
+        <p:nvSpPr>
+          <p:cNvPr id="4" name="Espace réservé de l'image des diapositives 3"/>
+          <p:cNvSpPr>
+            <a:spLocks noGrp="1" noRot="1" noChangeAspect="1"/>
+          </p:cNvSpPr>
+          <p:nvPr>
+            <p:ph type="sldImg" idx="2"/>
+          </p:nvPr>
+        </p:nvSpPr>
+        <p:spPr>
+          <a:xfrm>
+            <a:off x="685800" y="1143000"/>
+            <a:ext cx="5486400" cy="3086100"/>
+          </a:xfrm>
+          <a:prstGeom prst="rect">
+            <a:avLst/>
+          </a:prstGeom>
+          <a:noFill/>
+          <a:ln w="12700">
+            <a:solidFill>
+              <a:prstClr val="black"/>
+            </a:solidFill>
+          </a:ln>
+        </p:spPr>
+        <p:txBody>
+          <a:bodyPr vert="horz" lIns="91440" tIns="45720" rIns="91440" bIns="45720" rtlCol="0" anchor="ctr"/>
+          <a:lstStyle/>
+          <a:p>
+            <a:endParaRPr lang="fr-FR"/>
+          </a:p>
+        </p:txBody>
+      </p:sp>
+      <p:sp>
+        <p:nvSpPr>
+          <p:cNvPr id="5" name="Espace réservé des notes 4"/>
+          <p:cNvSpPr>
+            <a:spLocks noGrp="1"/>
+          </p:cNvSpPr>
+          <p:nvPr>
+            <p:ph type="body" sz="quarter" idx="3"/>
+          </p:nvPr>
+        </p:nvSpPr>
+        <p:spPr>
+          <a:xfrm>
+            <a:off x="685800" y="4400550"/>
+            <a:ext cx="5486400" cy="3600450"/>
+          </a:xfrm>
+          <a:prstGeom prst="rect">
+            <a:avLst/>
+          </a:prstGeom>
+        </p:spPr>
+        <p:txBody>
+          <a:bodyPr vert="horz" lIns="91440" tIns="45720" rIns="91440" bIns="45720" rtlCol="0"/>
+          <a:lstStyle/>
+          <a:p>
+            <a:pPr lvl="0"/>
+            <a:r>
+              <a:rPr lang="fr-FR"/>
+              <a:t>Cliquez pour modifier les styles du texte du masque</a:t>
+            </a:r>
+          </a:p>
+          <a:p>
+            <a:pPr lvl="1"/>
+            <a:r>
+              <a:rPr lang="fr-FR"/>
+              <a:t>Deuxième niveau</a:t>
+            </a:r>
+          </a:p>
+          <a:p>
+            <a:pPr lvl="2"/>
+            <a:r>
+              <a:rPr lang="fr-FR"/>
+              <a:t>Troisième niveau</a:t>
+            </a:r>
+          </a:p>
+          <a:p>
+            <a:pPr lvl="3"/>
+            <a:r>
+              <a:rPr lang="fr-FR"/>
+              <a:t>Quatrième niveau</a:t>
+            </a:r>
+          </a:p>
+          <a:p>
+            <a:pPr lvl="4"/>
+            <a:r>
+              <a:rPr lang="fr-FR"/>
+              <a:t>Cinquième niveau</a:t>
+            </a:r>
+          </a:p>
+        </p:txBody>
+      </p:sp>
+      <p:sp>
+        <p:nvSpPr>
+          <p:cNvPr id="6" name="Espace réservé du pied de page 5"/>
+          <p:cNvSpPr>
+            <a:spLocks noGrp="1"/>
+          </p:cNvSpPr>
+          <p:nvPr>
+            <p:ph type="ftr" sz="quarter" idx="4"/>
+          </p:nvPr>
+        </p:nvSpPr>
+        <p:spPr>
+          <a:xfrm>
+            <a:off x="0" y="8685213"/>
+            <a:ext cx="2971800" cy="458787"/>
+          </a:xfrm>
+          <a:prstGeom prst="rect">
+            <a:avLst/>
+          </a:prstGeom>
+        </p:spPr>
+        <p:txBody>
+          <a:bodyPr vert="horz" lIns="91440" tIns="45720" rIns="91440" bIns="45720" rtlCol="0" anchor="b"/>
+          <a:lstStyle>
+            <a:lvl1pPr algn="l">
+              <a:defRPr sz="1200"/>
+            </a:lvl1pPr>
+          </a:lstStyle>
+          <a:p>
+            <a:endParaRPr lang="fr-FR"/>
+          </a:p>
+        </p:txBody>
+      </p:sp>
+      <p:sp>
+        <p:nvSpPr>
+          <p:cNvPr id="7" name="Espace réservé du numéro de diapositive 6"/>
+          <p:cNvSpPr>
+            <a:spLocks noGrp="1"/>
+          </p:cNvSpPr>
+          <p:nvPr>
+            <p:ph type="sldNum" sz="quarter" idx="5"/>
+          </p:nvPr>
+        </p:nvSpPr>
+        <p:spPr>
+          <a:xfrm>
+            <a:off x="3884613" y="8685213"/>
+            <a:ext cx="2971800" cy="458787"/>
+          </a:xfrm>
+          <a:prstGeom prst="rect">
+            <a:avLst/>
+          </a:prstGeom>
+        </p:spPr>
+        <p:txBody>
+          <a:bodyPr vert="horz" lIns="91440" tIns="45720" rIns="91440" bIns="45720" rtlCol="0" anchor="b"/>
+          <a:lstStyle>
+            <a:lvl1pPr algn="r">
+              <a:defRPr sz="1200"/>
+            </a:lvl1pPr>
+          </a:lstStyle>
+          <a:p>
+            <a:fld id="{5C59ACF3-7CB3-4035-AD17-91B417FE2F15}" type="slidenum">
+              <a:rPr lang="fr-FR" smtClean="0"/>
+              <a:t>‹N°›</a:t>
+            </a:fld>
+            <a:endParaRPr lang="fr-FR"/>
+          </a:p>
+        </p:txBody>
+      </p:sp>
+    </p:spTree>
+    <p:extLst>
+      <p:ext uri="{BB962C8B-B14F-4D97-AF65-F5344CB8AC3E}">
+        <p14:creationId xmlns:p14="http://schemas.microsoft.com/office/powerpoint/2010/main" val="2010294909"/>
+      </p:ext>
+    </p:extLst>
+  </p:cSld>
+  <p:clrMap bg1="lt1" tx1="dk1" bg2="lt2" tx2="dk2" accent1="accent1" accent2="accent2" accent3="accent3" accent4="accent4" accent5="accent5" accent6="accent6" hlink="hlink" folHlink="folHlink"/>
+  <p:notesStyle>
+    <a:lvl1pPr marL="0" algn="l" defTabSz="914400" rtl="0" eaLnBrk="1" latinLnBrk="0" hangingPunct="1">
+      <a:defRPr sz="1200" kern="1200">
+        <a:solidFill>
+          <a:schemeClr val="tx1"/>
+        </a:solidFill>
+        <a:latin typeface="+mn-lt"/>
+        <a:ea typeface="+mn-ea"/>
+        <a:cs typeface="+mn-cs"/>
+      </a:defRPr>
+    </a:lvl1pPr>
+    <a:lvl2pPr marL="457200" algn="l" defTabSz="914400" rtl="0" eaLnBrk="1" latinLnBrk="0" hangingPunct="1">
+      <a:defRPr sz="1200" kern="1200">
+        <a:solidFill>
+          <a:schemeClr val="tx1"/>
+        </a:solidFill>
+        <a:latin typeface="+mn-lt"/>
+        <a:ea typeface="+mn-ea"/>
+        <a:cs typeface="+mn-cs"/>
+      </a:defRPr>
+    </a:lvl2pPr>
+    <a:lvl3pPr marL="914400" algn="l" defTabSz="914400" rtl="0" eaLnBrk="1" latinLnBrk="0" hangingPunct="1">
+      <a:defRPr sz="1200" kern="1200">
+        <a:solidFill>
+          <a:schemeClr val="tx1"/>
+        </a:solidFill>
+        <a:latin typeface="+mn-lt"/>
+        <a:ea typeface="+mn-ea"/>
+        <a:cs typeface="+mn-cs"/>
+      </a:defRPr>
+    </a:lvl3pPr>
+    <a:lvl4pPr marL="1371600" algn="l" defTabSz="914400" rtl="0" eaLnBrk="1" latinLnBrk="0" hangingPunct="1">
+      <a:defRPr sz="1200" kern="1200">
+        <a:solidFill>
+          <a:schemeClr val="tx1"/>
+        </a:solidFill>
+        <a:latin typeface="+mn-lt"/>
+        <a:ea typeface="+mn-ea"/>
+        <a:cs typeface="+mn-cs"/>
+      </a:defRPr>
+    </a:lvl4pPr>
+    <a:lvl5pPr marL="1828800" algn="l" defTabSz="914400" rtl="0" eaLnBrk="1" latinLnBrk="0" hangingPunct="1">
+      <a:defRPr sz="1200" kern="1200">
+        <a:solidFill>
+          <a:schemeClr val="tx1"/>
+        </a:solidFill>
+        <a:latin typeface="+mn-lt"/>
+        <a:ea typeface="+mn-ea"/>
+        <a:cs typeface="+mn-cs"/>
+      </a:defRPr>
+    </a:lvl5pPr>
+    <a:lvl6pPr marL="2286000" algn="l" defTabSz="914400" rtl="0" eaLnBrk="1" latinLnBrk="0" hangingPunct="1">
+      <a:defRPr sz="1200" kern="1200">
+        <a:solidFill>
+          <a:schemeClr val="tx1"/>
+        </a:solidFill>
+        <a:latin typeface="+mn-lt"/>
+        <a:ea typeface="+mn-ea"/>
+        <a:cs typeface="+mn-cs"/>
+      </a:defRPr>
+    </a:lvl6pPr>
+    <a:lvl7pPr marL="2743200" algn="l" defTabSz="914400" rtl="0" eaLnBrk="1" latinLnBrk="0" hangingPunct="1">
+      <a:defRPr sz="1200" kern="1200">
+        <a:solidFill>
+          <a:schemeClr val="tx1"/>
+        </a:solidFill>
+        <a:latin typeface="+mn-lt"/>
+        <a:ea typeface="+mn-ea"/>
+        <a:cs typeface="+mn-cs"/>
+      </a:defRPr>
+    </a:lvl7pPr>
+    <a:lvl8pPr marL="3200400" algn="l" defTabSz="914400" rtl="0" eaLnBrk="1" latinLnBrk="0" hangingPunct="1">
+      <a:defRPr sz="1200" kern="1200">
+        <a:solidFill>
+          <a:schemeClr val="tx1"/>
+        </a:solidFill>
+        <a:latin typeface="+mn-lt"/>
+        <a:ea typeface="+mn-ea"/>
+        <a:cs typeface="+mn-cs"/>
+      </a:defRPr>
+    </a:lvl8pPr>
+    <a:lvl9pPr marL="3657600" algn="l" defTabSz="914400" rtl="0" eaLnBrk="1" latinLnBrk="0" hangingPunct="1">
+      <a:defRPr sz="1200" kern="1200">
+        <a:solidFill>
+          <a:schemeClr val="tx1"/>
+        </a:solidFill>
+        <a:latin typeface="+mn-lt"/>
+        <a:ea typeface="+mn-ea"/>
+        <a:cs typeface="+mn-cs"/>
+      </a:defRPr>
+    </a:lvl9pPr>
+  </p:notesStyle>
+</p:notesMaster>
 </file>
 
 <file path=ppt/slideLayouts/slideLayout1.xml><?xml version="1.0" encoding="utf-8"?>
@@ -254,7 +616,7 @@
           <a:p>
             <a:fld id="{09379764-3B01-489A-94E4-0B76841ABA47}" type="datetimeFigureOut">
               <a:rPr lang="fr-FR" smtClean="0"/>
-              <a:t>20/08/2021</a:t>
+              <a:t>23/08/2021</a:t>
             </a:fld>
             <a:endParaRPr lang="fr-FR"/>
           </a:p>
@@ -452,7 +814,7 @@
           <a:p>
             <a:fld id="{09379764-3B01-489A-94E4-0B76841ABA47}" type="datetimeFigureOut">
               <a:rPr lang="fr-FR" smtClean="0"/>
-              <a:t>20/08/2021</a:t>
+              <a:t>23/08/2021</a:t>
             </a:fld>
             <a:endParaRPr lang="fr-FR"/>
           </a:p>
@@ -660,7 +1022,7 @@
           <a:p>
             <a:fld id="{09379764-3B01-489A-94E4-0B76841ABA47}" type="datetimeFigureOut">
               <a:rPr lang="fr-FR" smtClean="0"/>
-              <a:t>20/08/2021</a:t>
+              <a:t>23/08/2021</a:t>
             </a:fld>
             <a:endParaRPr lang="fr-FR"/>
           </a:p>
@@ -858,7 +1220,7 @@
           <a:p>
             <a:fld id="{09379764-3B01-489A-94E4-0B76841ABA47}" type="datetimeFigureOut">
               <a:rPr lang="fr-FR" smtClean="0"/>
-              <a:t>20/08/2021</a:t>
+              <a:t>23/08/2021</a:t>
             </a:fld>
             <a:endParaRPr lang="fr-FR"/>
           </a:p>
@@ -914,7 +1276,7 @@
               <a:rPr lang="fr-FR" smtClean="0"/>
               <a:t>‹N°›</a:t>
             </a:fld>
-            <a:endParaRPr lang="fr-FR"/>
+            <a:endParaRPr lang="fr-FR" dirty="0"/>
           </a:p>
         </p:txBody>
       </p:sp>
@@ -928,6 +1290,7 @@
   <p:clrMapOvr>
     <a:masterClrMapping/>
   </p:clrMapOvr>
+  <p:hf hdr="0" ftr="0" dt="0"/>
 </p:sldLayout>
 </file>
 
@@ -1133,7 +1496,7 @@
           <a:p>
             <a:fld id="{09379764-3B01-489A-94E4-0B76841ABA47}" type="datetimeFigureOut">
               <a:rPr lang="fr-FR" smtClean="0"/>
-              <a:t>20/08/2021</a:t>
+              <a:t>23/08/2021</a:t>
             </a:fld>
             <a:endParaRPr lang="fr-FR"/>
           </a:p>
@@ -1398,7 +1761,7 @@
           <a:p>
             <a:fld id="{09379764-3B01-489A-94E4-0B76841ABA47}" type="datetimeFigureOut">
               <a:rPr lang="fr-FR" smtClean="0"/>
-              <a:t>20/08/2021</a:t>
+              <a:t>23/08/2021</a:t>
             </a:fld>
             <a:endParaRPr lang="fr-FR"/>
           </a:p>
@@ -1810,7 +2173,7 @@
           <a:p>
             <a:fld id="{09379764-3B01-489A-94E4-0B76841ABA47}" type="datetimeFigureOut">
               <a:rPr lang="fr-FR" smtClean="0"/>
-              <a:t>20/08/2021</a:t>
+              <a:t>23/08/2021</a:t>
             </a:fld>
             <a:endParaRPr lang="fr-FR"/>
           </a:p>
@@ -1951,7 +2314,7 @@
           <a:p>
             <a:fld id="{09379764-3B01-489A-94E4-0B76841ABA47}" type="datetimeFigureOut">
               <a:rPr lang="fr-FR" smtClean="0"/>
-              <a:t>20/08/2021</a:t>
+              <a:t>23/08/2021</a:t>
             </a:fld>
             <a:endParaRPr lang="fr-FR"/>
           </a:p>
@@ -2064,7 +2427,7 @@
           <a:p>
             <a:fld id="{09379764-3B01-489A-94E4-0B76841ABA47}" type="datetimeFigureOut">
               <a:rPr lang="fr-FR" smtClean="0"/>
-              <a:t>20/08/2021</a:t>
+              <a:t>23/08/2021</a:t>
             </a:fld>
             <a:endParaRPr lang="fr-FR"/>
           </a:p>
@@ -2375,7 +2738,7 @@
           <a:p>
             <a:fld id="{09379764-3B01-489A-94E4-0B76841ABA47}" type="datetimeFigureOut">
               <a:rPr lang="fr-FR" smtClean="0"/>
-              <a:t>20/08/2021</a:t>
+              <a:t>23/08/2021</a:t>
             </a:fld>
             <a:endParaRPr lang="fr-FR"/>
           </a:p>
@@ -2663,7 +3026,7 @@
           <a:p>
             <a:fld id="{09379764-3B01-489A-94E4-0B76841ABA47}" type="datetimeFigureOut">
               <a:rPr lang="fr-FR" smtClean="0"/>
-              <a:t>20/08/2021</a:t>
+              <a:t>23/08/2021</a:t>
             </a:fld>
             <a:endParaRPr lang="fr-FR"/>
           </a:p>
@@ -2904,7 +3267,7 @@
           <a:p>
             <a:fld id="{09379764-3B01-489A-94E4-0B76841ABA47}" type="datetimeFigureOut">
               <a:rPr lang="fr-FR" smtClean="0"/>
-              <a:t>20/08/2021</a:t>
+              <a:t>23/08/2021</a:t>
             </a:fld>
             <a:endParaRPr lang="fr-FR"/>
           </a:p>
@@ -3323,31 +3686,6 @@
       </p:grpSpPr>
       <p:sp>
         <p:nvSpPr>
-          <p:cNvPr id="2" name="Titre 1">
-            <a:extLst>
-              <a:ext uri="{FF2B5EF4-FFF2-40B4-BE49-F238E27FC236}">
-                <a16:creationId xmlns:a16="http://schemas.microsoft.com/office/drawing/2014/main" id="{14E3BDED-110F-468D-B880-847F0DE3B7D4}"/>
-              </a:ext>
-            </a:extLst>
-          </p:cNvPr>
-          <p:cNvSpPr>
-            <a:spLocks noGrp="1"/>
-          </p:cNvSpPr>
-          <p:nvPr>
-            <p:ph type="ctrTitle"/>
-          </p:nvPr>
-        </p:nvSpPr>
-        <p:spPr/>
-        <p:txBody>
-          <a:bodyPr/>
-          <a:lstStyle/>
-          <a:p>
-            <a:endParaRPr lang="fr-FR"/>
-          </a:p>
-        </p:txBody>
-      </p:sp>
-      <p:sp>
-        <p:nvSpPr>
           <p:cNvPr id="3" name="Sous-titre 2">
             <a:extLst>
               <a:ext uri="{FF2B5EF4-FFF2-40B4-BE49-F238E27FC236}">
@@ -3362,19 +3700,957 @@
             <p:ph type="subTitle" idx="1"/>
           </p:nvPr>
         </p:nvSpPr>
-        <p:spPr/>
-        <p:txBody>
-          <a:bodyPr/>
-          <a:lstStyle/>
-          <a:p>
-            <a:endParaRPr lang="fr-FR"/>
-          </a:p>
-        </p:txBody>
-      </p:sp>
+        <p:spPr>
+          <a:xfrm>
+            <a:off x="1524000" y="3602037"/>
+            <a:ext cx="9144000" cy="2693987"/>
+          </a:xfrm>
+        </p:spPr>
+        <p:txBody>
+          <a:bodyPr/>
+          <a:lstStyle/>
+          <a:p>
+            <a:r>
+              <a:rPr lang="fr-FR" sz="4800" dirty="0"/>
+              <a:t>Appli de mentorat</a:t>
+            </a:r>
+          </a:p>
+          <a:p>
+            <a:r>
+              <a:rPr lang="fr-FR" sz="4800" dirty="0"/>
+              <a:t>Domain Driven Design</a:t>
+            </a:r>
+          </a:p>
+          <a:p>
+            <a:endParaRPr lang="fr-FR" dirty="0"/>
+          </a:p>
+          <a:p>
+            <a:r>
+              <a:rPr lang="fr-FR" dirty="0"/>
+              <a:t>Olivier MOREL</a:t>
+            </a:r>
+          </a:p>
+          <a:p>
+            <a:endParaRPr lang="fr-FR" sz="4800" dirty="0"/>
+          </a:p>
+        </p:txBody>
+      </p:sp>
+      <p:pic>
+        <p:nvPicPr>
+          <p:cNvPr id="1028" name="Picture 4" descr="Bienvenue chez FuzeScrum !">
+            <a:hlinkClick r:id="rId2"/>
+            <a:extLst>
+              <a:ext uri="{FF2B5EF4-FFF2-40B4-BE49-F238E27FC236}">
+                <a16:creationId xmlns:a16="http://schemas.microsoft.com/office/drawing/2014/main" id="{F83D82F9-EF42-424A-8E8E-5D919731E58F}"/>
+              </a:ext>
+            </a:extLst>
+          </p:cNvPr>
+          <p:cNvPicPr>
+            <a:picLocks noChangeAspect="1" noChangeArrowheads="1"/>
+          </p:cNvPicPr>
+          <p:nvPr/>
+        </p:nvPicPr>
+        <p:blipFill>
+          <a:blip r:embed="rId3">
+            <a:extLst>
+              <a:ext uri="{28A0092B-C50C-407E-A947-70E740481C1C}">
+                <a14:useLocalDpi xmlns:a14="http://schemas.microsoft.com/office/drawing/2010/main" val="0"/>
+              </a:ext>
+            </a:extLst>
+          </a:blip>
+          <a:srcRect/>
+          <a:stretch>
+            <a:fillRect/>
+          </a:stretch>
+        </p:blipFill>
+        <p:spPr bwMode="auto">
+          <a:xfrm>
+            <a:off x="4069701" y="388937"/>
+            <a:ext cx="3810000" cy="2867025"/>
+          </a:xfrm>
+          <a:prstGeom prst="rect">
+            <a:avLst/>
+          </a:prstGeom>
+          <a:noFill/>
+          <a:extLst>
+            <a:ext uri="{909E8E84-426E-40DD-AFC4-6F175D3DCCD1}">
+              <a14:hiddenFill xmlns:a14="http://schemas.microsoft.com/office/drawing/2010/main">
+                <a:solidFill>
+                  <a:srgbClr val="FFFFFF"/>
+                </a:solidFill>
+              </a14:hiddenFill>
+            </a:ext>
+          </a:extLst>
+        </p:spPr>
+      </p:pic>
     </p:spTree>
     <p:extLst>
       <p:ext uri="{BB962C8B-B14F-4D97-AF65-F5344CB8AC3E}">
         <p14:creationId xmlns:p14="http://schemas.microsoft.com/office/powerpoint/2010/main" val="1555762826"/>
+      </p:ext>
+    </p:extLst>
+  </p:cSld>
+  <p:clrMapOvr>
+    <a:masterClrMapping/>
+  </p:clrMapOvr>
+</p:sld>
+</file>
+
+<file path=ppt/slides/slide2.xml><?xml version="1.0" encoding="utf-8"?>
+<p:sld xmlns:a="http://schemas.openxmlformats.org/drawingml/2006/main" xmlns:r="http://schemas.openxmlformats.org/officeDocument/2006/relationships" xmlns:p="http://schemas.openxmlformats.org/presentationml/2006/main">
+  <p:cSld>
+    <p:spTree>
+      <p:nvGrpSpPr>
+        <p:cNvPr id="1" name=""/>
+        <p:cNvGrpSpPr/>
+        <p:nvPr/>
+      </p:nvGrpSpPr>
+      <p:grpSpPr>
+        <a:xfrm>
+          <a:off x="0" y="0"/>
+          <a:ext cx="0" cy="0"/>
+          <a:chOff x="0" y="0"/>
+          <a:chExt cx="0" cy="0"/>
+        </a:xfrm>
+      </p:grpSpPr>
+      <p:sp>
+        <p:nvSpPr>
+          <p:cNvPr id="2" name="Titre 1">
+            <a:extLst>
+              <a:ext uri="{FF2B5EF4-FFF2-40B4-BE49-F238E27FC236}">
+                <a16:creationId xmlns:a16="http://schemas.microsoft.com/office/drawing/2014/main" id="{BDEC45C1-1E4A-4BAF-B2B6-4A88C4C90BE1}"/>
+              </a:ext>
+            </a:extLst>
+          </p:cNvPr>
+          <p:cNvSpPr>
+            <a:spLocks noGrp="1"/>
+          </p:cNvSpPr>
+          <p:nvPr>
+            <p:ph type="title"/>
+          </p:nvPr>
+        </p:nvSpPr>
+        <p:spPr/>
+        <p:txBody>
+          <a:bodyPr/>
+          <a:lstStyle/>
+          <a:p>
+            <a:r>
+              <a:rPr lang="fr-FR" dirty="0"/>
+              <a:t>Sommaire</a:t>
+            </a:r>
+          </a:p>
+        </p:txBody>
+      </p:sp>
+      <p:sp>
+        <p:nvSpPr>
+          <p:cNvPr id="3" name="Espace réservé du contenu 2">
+            <a:extLst>
+              <a:ext uri="{FF2B5EF4-FFF2-40B4-BE49-F238E27FC236}">
+                <a16:creationId xmlns:a16="http://schemas.microsoft.com/office/drawing/2014/main" id="{8479394F-EA41-4DEA-9A0F-10D2C99528EF}"/>
+              </a:ext>
+            </a:extLst>
+          </p:cNvPr>
+          <p:cNvSpPr>
+            <a:spLocks noGrp="1"/>
+          </p:cNvSpPr>
+          <p:nvPr>
+            <p:ph idx="1"/>
+          </p:nvPr>
+        </p:nvSpPr>
+        <p:spPr/>
+        <p:txBody>
+          <a:bodyPr/>
+          <a:lstStyle/>
+          <a:p>
+            <a:r>
+              <a:rPr lang="fr-FR" dirty="0"/>
+              <a:t>Planning et itérations . . . . . . . . . . . . . . . . . . . . . . . . . . .2</a:t>
+            </a:r>
+          </a:p>
+          <a:p>
+            <a:r>
+              <a:rPr lang="fr-FR" dirty="0"/>
+              <a:t> </a:t>
+            </a:r>
+          </a:p>
+        </p:txBody>
+      </p:sp>
+      <p:sp>
+        <p:nvSpPr>
+          <p:cNvPr id="4" name="Espace réservé du numéro de diapositive 3">
+            <a:extLst>
+              <a:ext uri="{FF2B5EF4-FFF2-40B4-BE49-F238E27FC236}">
+                <a16:creationId xmlns:a16="http://schemas.microsoft.com/office/drawing/2014/main" id="{62AF73B6-8C18-4C63-AF97-A88D3E75ADD4}"/>
+              </a:ext>
+            </a:extLst>
+          </p:cNvPr>
+          <p:cNvSpPr>
+            <a:spLocks noGrp="1"/>
+          </p:cNvSpPr>
+          <p:nvPr>
+            <p:ph type="sldNum" sz="quarter" idx="12"/>
+          </p:nvPr>
+        </p:nvSpPr>
+        <p:spPr/>
+        <p:txBody>
+          <a:bodyPr/>
+          <a:lstStyle/>
+          <a:p>
+            <a:fld id="{6C97E930-14A5-472D-AD2C-D42CAE897216}" type="slidenum">
+              <a:rPr lang="fr-FR" smtClean="0"/>
+              <a:t>2</a:t>
+            </a:fld>
+            <a:endParaRPr lang="fr-FR" dirty="0"/>
+          </a:p>
+        </p:txBody>
+      </p:sp>
+    </p:spTree>
+    <p:extLst>
+      <p:ext uri="{BB962C8B-B14F-4D97-AF65-F5344CB8AC3E}">
+        <p14:creationId xmlns:p14="http://schemas.microsoft.com/office/powerpoint/2010/main" val="2130760336"/>
+      </p:ext>
+    </p:extLst>
+  </p:cSld>
+  <p:clrMapOvr>
+    <a:masterClrMapping/>
+  </p:clrMapOvr>
+</p:sld>
+</file>
+
+<file path=ppt/slides/slide3.xml><?xml version="1.0" encoding="utf-8"?>
+<p:sld xmlns:a="http://schemas.openxmlformats.org/drawingml/2006/main" xmlns:r="http://schemas.openxmlformats.org/officeDocument/2006/relationships" xmlns:p="http://schemas.openxmlformats.org/presentationml/2006/main">
+  <p:cSld>
+    <p:spTree>
+      <p:nvGrpSpPr>
+        <p:cNvPr id="1" name=""/>
+        <p:cNvGrpSpPr/>
+        <p:nvPr/>
+      </p:nvGrpSpPr>
+      <p:grpSpPr>
+        <a:xfrm>
+          <a:off x="0" y="0"/>
+          <a:ext cx="0" cy="0"/>
+          <a:chOff x="0" y="0"/>
+          <a:chExt cx="0" cy="0"/>
+        </a:xfrm>
+      </p:grpSpPr>
+      <p:sp>
+        <p:nvSpPr>
+          <p:cNvPr id="2" name="Titre 1">
+            <a:extLst>
+              <a:ext uri="{FF2B5EF4-FFF2-40B4-BE49-F238E27FC236}">
+                <a16:creationId xmlns:a16="http://schemas.microsoft.com/office/drawing/2014/main" id="{5AF98403-8FD9-43DD-9598-F00B37B903EC}"/>
+              </a:ext>
+            </a:extLst>
+          </p:cNvPr>
+          <p:cNvSpPr>
+            <a:spLocks noGrp="1"/>
+          </p:cNvSpPr>
+          <p:nvPr>
+            <p:ph type="title"/>
+          </p:nvPr>
+        </p:nvSpPr>
+        <p:spPr/>
+        <p:txBody>
+          <a:bodyPr/>
+          <a:lstStyle/>
+          <a:p>
+            <a:pPr algn="ctr"/>
+            <a:r>
+              <a:rPr lang="fr-FR" dirty="0"/>
+              <a:t>Planning et itérations</a:t>
+            </a:r>
+          </a:p>
+        </p:txBody>
+      </p:sp>
+      <p:sp>
+        <p:nvSpPr>
+          <p:cNvPr id="4" name="Espace réservé du numéro de diapositive 3">
+            <a:extLst>
+              <a:ext uri="{FF2B5EF4-FFF2-40B4-BE49-F238E27FC236}">
+                <a16:creationId xmlns:a16="http://schemas.microsoft.com/office/drawing/2014/main" id="{59C6B470-1E60-4972-B06A-F0F65392E72F}"/>
+              </a:ext>
+            </a:extLst>
+          </p:cNvPr>
+          <p:cNvSpPr>
+            <a:spLocks noGrp="1"/>
+          </p:cNvSpPr>
+          <p:nvPr>
+            <p:ph type="sldNum" sz="quarter" idx="12"/>
+          </p:nvPr>
+        </p:nvSpPr>
+        <p:spPr/>
+        <p:txBody>
+          <a:bodyPr/>
+          <a:lstStyle/>
+          <a:p>
+            <a:fld id="{6C97E930-14A5-472D-AD2C-D42CAE897216}" type="slidenum">
+              <a:rPr lang="fr-FR" smtClean="0">
+                <a:solidFill>
+                  <a:schemeClr val="tx1"/>
+                </a:solidFill>
+              </a:rPr>
+              <a:t>3</a:t>
+            </a:fld>
+            <a:endParaRPr lang="fr-FR" dirty="0">
+              <a:solidFill>
+                <a:schemeClr val="tx1"/>
+              </a:solidFill>
+            </a:endParaRPr>
+          </a:p>
+        </p:txBody>
+      </p:sp>
+      <p:pic>
+        <p:nvPicPr>
+          <p:cNvPr id="6" name="Image 5">
+            <a:extLst>
+              <a:ext uri="{FF2B5EF4-FFF2-40B4-BE49-F238E27FC236}">
+                <a16:creationId xmlns:a16="http://schemas.microsoft.com/office/drawing/2014/main" id="{DB127017-306F-4ED1-B5DF-71B500DC4E9C}"/>
+              </a:ext>
+            </a:extLst>
+          </p:cNvPr>
+          <p:cNvPicPr>
+            <a:picLocks noChangeAspect="1"/>
+          </p:cNvPicPr>
+          <p:nvPr/>
+        </p:nvPicPr>
+        <p:blipFill>
+          <a:blip r:embed="rId2">
+            <a:extLst>
+              <a:ext uri="{28A0092B-C50C-407E-A947-70E740481C1C}">
+                <a14:useLocalDpi xmlns:a14="http://schemas.microsoft.com/office/drawing/2010/main" val="0"/>
+              </a:ext>
+            </a:extLst>
+          </a:blip>
+          <a:stretch>
+            <a:fillRect/>
+          </a:stretch>
+        </p:blipFill>
+        <p:spPr>
+          <a:xfrm>
+            <a:off x="0" y="1756144"/>
+            <a:ext cx="12192000" cy="3345712"/>
+          </a:xfrm>
+          <a:prstGeom prst="rect">
+            <a:avLst/>
+          </a:prstGeom>
+        </p:spPr>
+      </p:pic>
+    </p:spTree>
+    <p:extLst>
+      <p:ext uri="{BB962C8B-B14F-4D97-AF65-F5344CB8AC3E}">
+        <p14:creationId xmlns:p14="http://schemas.microsoft.com/office/powerpoint/2010/main" val="1410245609"/>
+      </p:ext>
+    </p:extLst>
+  </p:cSld>
+  <p:clrMapOvr>
+    <a:masterClrMapping/>
+  </p:clrMapOvr>
+</p:sld>
+</file>
+
+<file path=ppt/slides/slide4.xml><?xml version="1.0" encoding="utf-8"?>
+<p:sld xmlns:a="http://schemas.openxmlformats.org/drawingml/2006/main" xmlns:r="http://schemas.openxmlformats.org/officeDocument/2006/relationships" xmlns:p="http://schemas.openxmlformats.org/presentationml/2006/main">
+  <p:cSld>
+    <p:spTree>
+      <p:nvGrpSpPr>
+        <p:cNvPr id="1" name=""/>
+        <p:cNvGrpSpPr/>
+        <p:nvPr/>
+      </p:nvGrpSpPr>
+      <p:grpSpPr>
+        <a:xfrm>
+          <a:off x="0" y="0"/>
+          <a:ext cx="0" cy="0"/>
+          <a:chOff x="0" y="0"/>
+          <a:chExt cx="0" cy="0"/>
+        </a:xfrm>
+      </p:grpSpPr>
+      <p:sp>
+        <p:nvSpPr>
+          <p:cNvPr id="2" name="Titre 1">
+            <a:extLst>
+              <a:ext uri="{FF2B5EF4-FFF2-40B4-BE49-F238E27FC236}">
+                <a16:creationId xmlns:a16="http://schemas.microsoft.com/office/drawing/2014/main" id="{829EB31C-1681-440B-A4EB-A3FEC391AB36}"/>
+              </a:ext>
+            </a:extLst>
+          </p:cNvPr>
+          <p:cNvSpPr>
+            <a:spLocks noGrp="1"/>
+          </p:cNvSpPr>
+          <p:nvPr>
+            <p:ph type="title"/>
+          </p:nvPr>
+        </p:nvSpPr>
+        <p:spPr/>
+        <p:txBody>
+          <a:bodyPr/>
+          <a:lstStyle/>
+          <a:p>
+            <a:r>
+              <a:rPr lang="fr-FR" dirty="0"/>
+              <a:t>Analyser et interpréter ce que le client dit</a:t>
+            </a:r>
+          </a:p>
+        </p:txBody>
+      </p:sp>
+      <p:sp>
+        <p:nvSpPr>
+          <p:cNvPr id="3" name="Espace réservé du contenu 2">
+            <a:extLst>
+              <a:ext uri="{FF2B5EF4-FFF2-40B4-BE49-F238E27FC236}">
+                <a16:creationId xmlns:a16="http://schemas.microsoft.com/office/drawing/2014/main" id="{95221F84-088F-41DD-BB91-A9766FFCE020}"/>
+              </a:ext>
+            </a:extLst>
+          </p:cNvPr>
+          <p:cNvSpPr>
+            <a:spLocks noGrp="1"/>
+          </p:cNvSpPr>
+          <p:nvPr>
+            <p:ph idx="1"/>
+          </p:nvPr>
+        </p:nvSpPr>
+        <p:spPr/>
+        <p:txBody>
+          <a:bodyPr/>
+          <a:lstStyle/>
+          <a:p>
+            <a:r>
+              <a:rPr lang="fr-FR" dirty="0"/>
+              <a:t>Lecture des documents pour trouver les réponse au Quoi ? Pour qui ? Et Pourquoi ?</a:t>
+            </a:r>
+          </a:p>
+          <a:p>
+            <a:endParaRPr lang="fr-FR" dirty="0"/>
+          </a:p>
+          <a:p>
+            <a:r>
+              <a:rPr lang="fr-FR" dirty="0"/>
+              <a:t>Remplissage de fiches dont le modèle est :</a:t>
+            </a:r>
+          </a:p>
+          <a:p>
+            <a:endParaRPr lang="fr-FR" dirty="0"/>
+          </a:p>
+          <a:p>
+            <a:endParaRPr lang="fr-FR" dirty="0"/>
+          </a:p>
+        </p:txBody>
+      </p:sp>
+      <p:sp>
+        <p:nvSpPr>
+          <p:cNvPr id="4" name="Espace réservé du numéro de diapositive 3">
+            <a:extLst>
+              <a:ext uri="{FF2B5EF4-FFF2-40B4-BE49-F238E27FC236}">
+                <a16:creationId xmlns:a16="http://schemas.microsoft.com/office/drawing/2014/main" id="{250280D3-5E29-4E4F-AD4F-28CA384FFAF5}"/>
+              </a:ext>
+            </a:extLst>
+          </p:cNvPr>
+          <p:cNvSpPr>
+            <a:spLocks noGrp="1"/>
+          </p:cNvSpPr>
+          <p:nvPr>
+            <p:ph type="sldNum" sz="quarter" idx="12"/>
+          </p:nvPr>
+        </p:nvSpPr>
+        <p:spPr/>
+        <p:txBody>
+          <a:bodyPr/>
+          <a:lstStyle/>
+          <a:p>
+            <a:fld id="{6C97E930-14A5-472D-AD2C-D42CAE897216}" type="slidenum">
+              <a:rPr lang="fr-FR" smtClean="0"/>
+              <a:t>4</a:t>
+            </a:fld>
+            <a:endParaRPr lang="fr-FR" dirty="0"/>
+          </a:p>
+        </p:txBody>
+      </p:sp>
+      <p:graphicFrame>
+        <p:nvGraphicFramePr>
+          <p:cNvPr id="6" name="Tableau 5">
+            <a:extLst>
+              <a:ext uri="{FF2B5EF4-FFF2-40B4-BE49-F238E27FC236}">
+                <a16:creationId xmlns:a16="http://schemas.microsoft.com/office/drawing/2014/main" id="{EB62E992-96B6-4C82-A7A7-9836478B8B08}"/>
+              </a:ext>
+            </a:extLst>
+          </p:cNvPr>
+          <p:cNvGraphicFramePr>
+            <a:graphicFrameLocks noGrp="1"/>
+          </p:cNvGraphicFramePr>
+          <p:nvPr>
+            <p:extLst>
+              <p:ext uri="{D42A27DB-BD31-4B8C-83A1-F6EECF244321}">
+                <p14:modId xmlns:p14="http://schemas.microsoft.com/office/powerpoint/2010/main" val="3003306546"/>
+              </p:ext>
+            </p:extLst>
+          </p:nvPr>
+        </p:nvGraphicFramePr>
+        <p:xfrm>
+          <a:off x="1012733" y="3929448"/>
+          <a:ext cx="9698809" cy="2426902"/>
+        </p:xfrm>
+        <a:graphic>
+          <a:graphicData uri="http://schemas.openxmlformats.org/drawingml/2006/table">
+            <a:tbl>
+              <a:tblPr firstRow="1" firstCol="1" bandRow="1"/>
+              <a:tblGrid>
+                <a:gridCol w="9698809">
+                  <a:extLst>
+                    <a:ext uri="{9D8B030D-6E8A-4147-A177-3AD203B41FA5}">
+                      <a16:colId xmlns:a16="http://schemas.microsoft.com/office/drawing/2014/main" val="1586406967"/>
+                    </a:ext>
+                  </a:extLst>
+                </a:gridCol>
+              </a:tblGrid>
+              <a:tr h="2426902">
+                <a:tc>
+                  <a:txBody>
+                    <a:bodyPr/>
+                    <a:lstStyle/>
+                    <a:p>
+                      <a:pPr>
+                        <a:lnSpc>
+                          <a:spcPct val="107000"/>
+                        </a:lnSpc>
+                        <a:spcAft>
+                          <a:spcPts val="600"/>
+                        </a:spcAft>
+                      </a:pPr>
+                      <a:r>
+                        <a:rPr lang="fr-FR" sz="2800" dirty="0">
+                          <a:solidFill>
+                            <a:srgbClr val="C00000"/>
+                          </a:solidFill>
+                          <a:effectLst/>
+                          <a:latin typeface="Calibri" panose="020F0502020204030204" pitchFamily="34" charset="0"/>
+                          <a:ea typeface="Calibri" panose="020F0502020204030204" pitchFamily="34" charset="0"/>
+                          <a:cs typeface="Arial" panose="020B0604020202020204" pitchFamily="34" charset="0"/>
+                        </a:rPr>
+                        <a:t>Système : </a:t>
+                      </a:r>
+                      <a:r>
+                        <a:rPr lang="fr-FR" sz="2800" dirty="0">
+                          <a:solidFill>
+                            <a:srgbClr val="000000"/>
+                          </a:solidFill>
+                          <a:effectLst/>
+                          <a:latin typeface="Calibri" panose="020F0502020204030204" pitchFamily="34" charset="0"/>
+                          <a:ea typeface="Calibri" panose="020F0502020204030204" pitchFamily="34" charset="0"/>
+                          <a:cs typeface="Arial" panose="020B0604020202020204" pitchFamily="34" charset="0"/>
+                        </a:rPr>
+                        <a:t>appli de mentorat</a:t>
+                      </a:r>
+                      <a:endParaRPr lang="fr-FR" sz="2800" dirty="0">
+                        <a:effectLst/>
+                        <a:latin typeface="Calibri" panose="020F0502020204030204" pitchFamily="34" charset="0"/>
+                        <a:ea typeface="Calibri" panose="020F0502020204030204" pitchFamily="34" charset="0"/>
+                        <a:cs typeface="Arial" panose="020B0604020202020204" pitchFamily="34" charset="0"/>
+                      </a:endParaRPr>
+                    </a:p>
+                    <a:p>
+                      <a:pPr>
+                        <a:lnSpc>
+                          <a:spcPct val="107000"/>
+                        </a:lnSpc>
+                        <a:spcAft>
+                          <a:spcPts val="600"/>
+                        </a:spcAft>
+                      </a:pPr>
+                      <a:r>
+                        <a:rPr lang="fr-FR" sz="2800" dirty="0">
+                          <a:solidFill>
+                            <a:srgbClr val="C00000"/>
+                          </a:solidFill>
+                          <a:effectLst/>
+                          <a:latin typeface="Calibri" panose="020F0502020204030204" pitchFamily="34" charset="0"/>
+                          <a:ea typeface="Calibri" panose="020F0502020204030204" pitchFamily="34" charset="0"/>
+                          <a:cs typeface="Arial" panose="020B0604020202020204" pitchFamily="34" charset="0"/>
+                        </a:rPr>
+                        <a:t>Scénario d’utilisation :</a:t>
+                      </a:r>
+                      <a:endParaRPr lang="fr-FR" sz="2800" dirty="0">
+                        <a:effectLst/>
+                        <a:latin typeface="Calibri" panose="020F0502020204030204" pitchFamily="34" charset="0"/>
+                        <a:ea typeface="Calibri" panose="020F0502020204030204" pitchFamily="34" charset="0"/>
+                        <a:cs typeface="Arial" panose="020B0604020202020204" pitchFamily="34" charset="0"/>
+                      </a:endParaRPr>
+                    </a:p>
+                    <a:p>
+                      <a:pPr>
+                        <a:lnSpc>
+                          <a:spcPct val="107000"/>
+                        </a:lnSpc>
+                        <a:spcAft>
+                          <a:spcPts val="600"/>
+                        </a:spcAft>
+                      </a:pPr>
+                      <a:r>
+                        <a:rPr lang="fr-FR" sz="2800" dirty="0">
+                          <a:solidFill>
+                            <a:srgbClr val="C00000"/>
+                          </a:solidFill>
+                          <a:effectLst/>
+                          <a:latin typeface="Calibri" panose="020F0502020204030204" pitchFamily="34" charset="0"/>
+                          <a:ea typeface="Calibri" panose="020F0502020204030204" pitchFamily="34" charset="0"/>
+                          <a:cs typeface="Arial" panose="020B0604020202020204" pitchFamily="34" charset="0"/>
+                        </a:rPr>
+                        <a:t>Finalité :</a:t>
+                      </a:r>
+                      <a:endParaRPr lang="fr-FR" sz="2800" dirty="0">
+                        <a:effectLst/>
+                        <a:latin typeface="Calibri" panose="020F0502020204030204" pitchFamily="34" charset="0"/>
+                        <a:ea typeface="Calibri" panose="020F0502020204030204" pitchFamily="34" charset="0"/>
+                        <a:cs typeface="Arial" panose="020B0604020202020204" pitchFamily="34" charset="0"/>
+                      </a:endParaRPr>
+                    </a:p>
+                    <a:p>
+                      <a:pPr>
+                        <a:lnSpc>
+                          <a:spcPct val="107000"/>
+                        </a:lnSpc>
+                        <a:spcAft>
+                          <a:spcPts val="600"/>
+                        </a:spcAft>
+                      </a:pPr>
+                      <a:r>
+                        <a:rPr lang="fr-FR" sz="2800" dirty="0">
+                          <a:solidFill>
+                            <a:srgbClr val="000000"/>
+                          </a:solidFill>
+                          <a:effectLst/>
+                          <a:latin typeface="Calibri" panose="020F0502020204030204" pitchFamily="34" charset="0"/>
+                          <a:ea typeface="Calibri" panose="020F0502020204030204" pitchFamily="34" charset="0"/>
+                          <a:cs typeface="Arial" panose="020B0604020202020204" pitchFamily="34" charset="0"/>
+                        </a:rPr>
+                        <a:t>[Description]</a:t>
+                      </a:r>
+                      <a:endParaRPr lang="fr-FR" sz="2800" dirty="0">
+                        <a:effectLst/>
+                        <a:latin typeface="Calibri" panose="020F0502020204030204" pitchFamily="34" charset="0"/>
+                        <a:ea typeface="Calibri" panose="020F0502020204030204" pitchFamily="34" charset="0"/>
+                        <a:cs typeface="Arial" panose="020B0604020202020204" pitchFamily="34" charset="0"/>
+                      </a:endParaRPr>
+                    </a:p>
+                  </a:txBody>
+                  <a:tcPr marL="68580" marR="68580" marT="0" marB="0">
+                    <a:lnL w="12700" cap="flat" cmpd="sng" algn="ctr">
+                      <a:solidFill>
+                        <a:srgbClr val="000000"/>
+                      </a:solidFill>
+                      <a:prstDash val="solid"/>
+                      <a:round/>
+                      <a:headEnd type="none" w="med" len="med"/>
+                      <a:tailEnd type="none" w="med" len="med"/>
+                    </a:lnL>
+                    <a:lnR w="12700" cap="flat" cmpd="sng" algn="ctr">
+                      <a:solidFill>
+                        <a:srgbClr val="000000"/>
+                      </a:solidFill>
+                      <a:prstDash val="solid"/>
+                      <a:round/>
+                      <a:headEnd type="none" w="med" len="med"/>
+                      <a:tailEnd type="none" w="med" len="med"/>
+                    </a:lnR>
+                    <a:lnT w="12700" cap="flat" cmpd="sng" algn="ctr">
+                      <a:solidFill>
+                        <a:srgbClr val="000000"/>
+                      </a:solidFill>
+                      <a:prstDash val="solid"/>
+                      <a:round/>
+                      <a:headEnd type="none" w="med" len="med"/>
+                      <a:tailEnd type="none" w="med" len="med"/>
+                    </a:lnT>
+                    <a:lnB w="12700" cap="flat" cmpd="sng" algn="ctr">
+                      <a:solidFill>
+                        <a:srgbClr val="000000"/>
+                      </a:solidFill>
+                      <a:prstDash val="solid"/>
+                      <a:round/>
+                      <a:headEnd type="none" w="med" len="med"/>
+                      <a:tailEnd type="none" w="med" len="med"/>
+                    </a:lnB>
+                  </a:tcPr>
+                </a:tc>
+                <a:extLst>
+                  <a:ext uri="{0D108BD9-81ED-4DB2-BD59-A6C34878D82A}">
+                    <a16:rowId xmlns:a16="http://schemas.microsoft.com/office/drawing/2014/main" val="3650463096"/>
+                  </a:ext>
+                </a:extLst>
+              </a:tr>
+            </a:tbl>
+          </a:graphicData>
+        </a:graphic>
+      </p:graphicFrame>
+    </p:spTree>
+    <p:extLst>
+      <p:ext uri="{BB962C8B-B14F-4D97-AF65-F5344CB8AC3E}">
+        <p14:creationId xmlns:p14="http://schemas.microsoft.com/office/powerpoint/2010/main" val="4263814605"/>
+      </p:ext>
+    </p:extLst>
+  </p:cSld>
+  <p:clrMapOvr>
+    <a:masterClrMapping/>
+  </p:clrMapOvr>
+</p:sld>
+</file>
+
+<file path=ppt/slides/slide5.xml><?xml version="1.0" encoding="utf-8"?>
+<p:sld xmlns:a="http://schemas.openxmlformats.org/drawingml/2006/main" xmlns:r="http://schemas.openxmlformats.org/officeDocument/2006/relationships" xmlns:p="http://schemas.openxmlformats.org/presentationml/2006/main">
+  <p:cSld>
+    <p:spTree>
+      <p:nvGrpSpPr>
+        <p:cNvPr id="1" name=""/>
+        <p:cNvGrpSpPr/>
+        <p:nvPr/>
+      </p:nvGrpSpPr>
+      <p:grpSpPr>
+        <a:xfrm>
+          <a:off x="0" y="0"/>
+          <a:ext cx="0" cy="0"/>
+          <a:chOff x="0" y="0"/>
+          <a:chExt cx="0" cy="0"/>
+        </a:xfrm>
+      </p:grpSpPr>
+      <p:sp>
+        <p:nvSpPr>
+          <p:cNvPr id="2" name="Titre 1">
+            <a:extLst>
+              <a:ext uri="{FF2B5EF4-FFF2-40B4-BE49-F238E27FC236}">
+                <a16:creationId xmlns:a16="http://schemas.microsoft.com/office/drawing/2014/main" id="{1228345F-E0FC-40FC-85E4-7ADFB0BFC5EC}"/>
+              </a:ext>
+            </a:extLst>
+          </p:cNvPr>
+          <p:cNvSpPr>
+            <a:spLocks noGrp="1"/>
+          </p:cNvSpPr>
+          <p:nvPr>
+            <p:ph type="title"/>
+          </p:nvPr>
+        </p:nvSpPr>
+        <p:spPr>
+          <a:xfrm>
+            <a:off x="548640" y="418011"/>
+            <a:ext cx="5628157" cy="6035039"/>
+          </a:xfrm>
+        </p:spPr>
+        <p:txBody>
+          <a:bodyPr>
+            <a:normAutofit/>
+          </a:bodyPr>
+          <a:lstStyle/>
+          <a:p>
+            <a:r>
+              <a:rPr lang="fr-FR" dirty="0"/>
+              <a:t>Event </a:t>
+            </a:r>
+            <a:r>
+              <a:rPr lang="fr-FR" dirty="0" err="1"/>
+              <a:t>Storming</a:t>
+            </a:r>
+            <a:r>
+              <a:rPr lang="fr-FR" dirty="0"/>
+              <a:t> avec les fiches regroupées par idées de cas d’utilisation</a:t>
+            </a:r>
+          </a:p>
+        </p:txBody>
+      </p:sp>
+      <p:sp>
+        <p:nvSpPr>
+          <p:cNvPr id="4" name="Espace réservé du numéro de diapositive 3">
+            <a:extLst>
+              <a:ext uri="{FF2B5EF4-FFF2-40B4-BE49-F238E27FC236}">
+                <a16:creationId xmlns:a16="http://schemas.microsoft.com/office/drawing/2014/main" id="{59577EB3-9732-487B-9ADA-BB7936FD0AFA}"/>
+              </a:ext>
+            </a:extLst>
+          </p:cNvPr>
+          <p:cNvSpPr>
+            <a:spLocks noGrp="1"/>
+          </p:cNvSpPr>
+          <p:nvPr>
+            <p:ph type="sldNum" sz="quarter" idx="12"/>
+          </p:nvPr>
+        </p:nvSpPr>
+        <p:spPr/>
+        <p:txBody>
+          <a:bodyPr/>
+          <a:lstStyle/>
+          <a:p>
+            <a:fld id="{6C97E930-14A5-472D-AD2C-D42CAE897216}" type="slidenum">
+              <a:rPr lang="fr-FR" smtClean="0"/>
+              <a:t>5</a:t>
+            </a:fld>
+            <a:endParaRPr lang="fr-FR" dirty="0"/>
+          </a:p>
+        </p:txBody>
+      </p:sp>
+      <p:pic>
+        <p:nvPicPr>
+          <p:cNvPr id="6" name="Image 5">
+            <a:extLst>
+              <a:ext uri="{FF2B5EF4-FFF2-40B4-BE49-F238E27FC236}">
+                <a16:creationId xmlns:a16="http://schemas.microsoft.com/office/drawing/2014/main" id="{167BE987-0E37-4EBF-8B2E-F6006FEA01E2}"/>
+              </a:ext>
+            </a:extLst>
+          </p:cNvPr>
+          <p:cNvPicPr>
+            <a:picLocks noChangeAspect="1"/>
+          </p:cNvPicPr>
+          <p:nvPr/>
+        </p:nvPicPr>
+        <p:blipFill>
+          <a:blip r:embed="rId2">
+            <a:extLst>
+              <a:ext uri="{28A0092B-C50C-407E-A947-70E740481C1C}">
+                <a14:useLocalDpi xmlns:a14="http://schemas.microsoft.com/office/drawing/2010/main" val="0"/>
+              </a:ext>
+            </a:extLst>
+          </a:blip>
+          <a:stretch>
+            <a:fillRect/>
+          </a:stretch>
+        </p:blipFill>
+        <p:spPr>
+          <a:xfrm>
+            <a:off x="6563842" y="0"/>
+            <a:ext cx="5628158" cy="6858000"/>
+          </a:xfrm>
+          <a:prstGeom prst="rect">
+            <a:avLst/>
+          </a:prstGeom>
+        </p:spPr>
+      </p:pic>
+    </p:spTree>
+    <p:extLst>
+      <p:ext uri="{BB962C8B-B14F-4D97-AF65-F5344CB8AC3E}">
+        <p14:creationId xmlns:p14="http://schemas.microsoft.com/office/powerpoint/2010/main" val="1954416120"/>
+      </p:ext>
+    </p:extLst>
+  </p:cSld>
+  <p:clrMapOvr>
+    <a:masterClrMapping/>
+  </p:clrMapOvr>
+</p:sld>
+</file>
+
+<file path=ppt/slides/slide6.xml><?xml version="1.0" encoding="utf-8"?>
+<p:sld xmlns:a="http://schemas.openxmlformats.org/drawingml/2006/main" xmlns:r="http://schemas.openxmlformats.org/officeDocument/2006/relationships" xmlns:p="http://schemas.openxmlformats.org/presentationml/2006/main">
+  <p:cSld>
+    <p:spTree>
+      <p:nvGrpSpPr>
+        <p:cNvPr id="1" name=""/>
+        <p:cNvGrpSpPr/>
+        <p:nvPr/>
+      </p:nvGrpSpPr>
+      <p:grpSpPr>
+        <a:xfrm>
+          <a:off x="0" y="0"/>
+          <a:ext cx="0" cy="0"/>
+          <a:chOff x="0" y="0"/>
+          <a:chExt cx="0" cy="0"/>
+        </a:xfrm>
+      </p:grpSpPr>
+      <p:sp>
+        <p:nvSpPr>
+          <p:cNvPr id="2" name="Titre 1">
+            <a:extLst>
+              <a:ext uri="{FF2B5EF4-FFF2-40B4-BE49-F238E27FC236}">
+                <a16:creationId xmlns:a16="http://schemas.microsoft.com/office/drawing/2014/main" id="{B9A3F10B-8919-47CE-AD73-FC939BEB0801}"/>
+              </a:ext>
+            </a:extLst>
+          </p:cNvPr>
+          <p:cNvSpPr>
+            <a:spLocks noGrp="1"/>
+          </p:cNvSpPr>
+          <p:nvPr>
+            <p:ph type="title"/>
+          </p:nvPr>
+        </p:nvSpPr>
+        <p:spPr>
+          <a:xfrm>
+            <a:off x="158931" y="399141"/>
+            <a:ext cx="4811391" cy="5991225"/>
+          </a:xfrm>
+        </p:spPr>
+        <p:txBody>
+          <a:bodyPr/>
+          <a:lstStyle/>
+          <a:p>
+            <a:r>
+              <a:rPr lang="fr-FR" dirty="0"/>
+              <a:t>Diagramme des cas d’utilisation</a:t>
+            </a:r>
+          </a:p>
+        </p:txBody>
+      </p:sp>
+      <p:pic>
+        <p:nvPicPr>
+          <p:cNvPr id="8" name="Espace réservé du contenu 7">
+            <a:extLst>
+              <a:ext uri="{FF2B5EF4-FFF2-40B4-BE49-F238E27FC236}">
+                <a16:creationId xmlns:a16="http://schemas.microsoft.com/office/drawing/2014/main" id="{D1D2937F-CDB0-4CB5-98A6-DB690606149C}"/>
+              </a:ext>
+            </a:extLst>
+          </p:cNvPr>
+          <p:cNvPicPr>
+            <a:picLocks noGrp="1" noChangeAspect="1"/>
+          </p:cNvPicPr>
+          <p:nvPr>
+            <p:ph idx="1"/>
+          </p:nvPr>
+        </p:nvPicPr>
+        <p:blipFill>
+          <a:blip r:embed="rId2">
+            <a:extLst>
+              <a:ext uri="{28A0092B-C50C-407E-A947-70E740481C1C}">
+                <a14:useLocalDpi xmlns:a14="http://schemas.microsoft.com/office/drawing/2010/main" val="0"/>
+              </a:ext>
+            </a:extLst>
+          </a:blip>
+          <a:stretch>
+            <a:fillRect/>
+          </a:stretch>
+        </p:blipFill>
+        <p:spPr>
+          <a:xfrm>
+            <a:off x="5310790" y="532401"/>
+            <a:ext cx="6329962" cy="5724707"/>
+          </a:xfrm>
+        </p:spPr>
+      </p:pic>
+      <p:sp>
+        <p:nvSpPr>
+          <p:cNvPr id="4" name="Espace réservé du numéro de diapositive 3">
+            <a:extLst>
+              <a:ext uri="{FF2B5EF4-FFF2-40B4-BE49-F238E27FC236}">
+                <a16:creationId xmlns:a16="http://schemas.microsoft.com/office/drawing/2014/main" id="{D5B05B50-AF86-4A81-86B6-60C269DF0BB3}"/>
+              </a:ext>
+            </a:extLst>
+          </p:cNvPr>
+          <p:cNvSpPr>
+            <a:spLocks noGrp="1"/>
+          </p:cNvSpPr>
+          <p:nvPr>
+            <p:ph type="sldNum" sz="quarter" idx="12"/>
+          </p:nvPr>
+        </p:nvSpPr>
+        <p:spPr/>
+        <p:txBody>
+          <a:bodyPr/>
+          <a:lstStyle/>
+          <a:p>
+            <a:fld id="{6C97E930-14A5-472D-AD2C-D42CAE897216}" type="slidenum">
+              <a:rPr lang="fr-FR" smtClean="0"/>
+              <a:t>6</a:t>
+            </a:fld>
+            <a:endParaRPr lang="fr-FR" dirty="0"/>
+          </a:p>
+        </p:txBody>
+      </p:sp>
+    </p:spTree>
+    <p:extLst>
+      <p:ext uri="{BB962C8B-B14F-4D97-AF65-F5344CB8AC3E}">
+        <p14:creationId xmlns:p14="http://schemas.microsoft.com/office/powerpoint/2010/main" val="2222453712"/>
       </p:ext>
     </p:extLst>
   </p:cSld>
@@ -3677,4 +4953,299 @@
     </a:ext>
   </a:extLst>
 </a:theme>
+</file>
+
+<file path=ppt/theme/theme2.xml><?xml version="1.0" encoding="utf-8"?>
+<a:theme xmlns:a="http://schemas.openxmlformats.org/drawingml/2006/main" name="Thème Office">
+  <a:themeElements>
+    <a:clrScheme name="Office">
+      <a:dk1>
+        <a:sysClr val="windowText" lastClr="000000"/>
+      </a:dk1>
+      <a:lt1>
+        <a:sysClr val="window" lastClr="FFFFFF"/>
+      </a:lt1>
+      <a:dk2>
+        <a:srgbClr val="44546A"/>
+      </a:dk2>
+      <a:lt2>
+        <a:srgbClr val="E7E6E6"/>
+      </a:lt2>
+      <a:accent1>
+        <a:srgbClr val="4472C4"/>
+      </a:accent1>
+      <a:accent2>
+        <a:srgbClr val="ED7D31"/>
+      </a:accent2>
+      <a:accent3>
+        <a:srgbClr val="A5A5A5"/>
+      </a:accent3>
+      <a:accent4>
+        <a:srgbClr val="FFC000"/>
+      </a:accent4>
+      <a:accent5>
+        <a:srgbClr val="5B9BD5"/>
+      </a:accent5>
+      <a:accent6>
+        <a:srgbClr val="70AD47"/>
+      </a:accent6>
+      <a:hlink>
+        <a:srgbClr val="0563C1"/>
+      </a:hlink>
+      <a:folHlink>
+        <a:srgbClr val="954F72"/>
+      </a:folHlink>
+    </a:clrScheme>
+    <a:fontScheme name="Office">
+      <a:majorFont>
+        <a:latin typeface="Calibri Light" panose="020F0302020204030204"/>
+        <a:ea typeface=""/>
+        <a:cs typeface=""/>
+        <a:font script="Jpan" typeface="游ゴシック Light"/>
+        <a:font script="Hang" typeface="맑은 고딕"/>
+        <a:font script="Hans" typeface="等线 Light"/>
+        <a:font script="Hant" typeface="新細明體"/>
+        <a:font script="Arab" typeface="Times New Roman"/>
+        <a:font script="Hebr" typeface="Times New Roman"/>
+        <a:font script="Thai" typeface="Angsana New"/>
+        <a:font script="Ethi" typeface="Nyala"/>
+        <a:font script="Beng" typeface="Vrinda"/>
+        <a:font script="Gujr" typeface="Shruti"/>
+        <a:font script="Khmr" typeface="MoolBoran"/>
+        <a:font script="Knda" typeface="Tunga"/>
+        <a:font script="Guru" typeface="Raavi"/>
+        <a:font script="Cans" typeface="Euphemia"/>
+        <a:font script="Cher" typeface="Plantagenet Cherokee"/>
+        <a:font script="Yiii" typeface="Microsoft Yi Baiti"/>
+        <a:font script="Tibt" typeface="Microsoft Himalaya"/>
+        <a:font script="Thaa" typeface="MV Boli"/>
+        <a:font script="Deva" typeface="Mangal"/>
+        <a:font script="Telu" typeface="Gautami"/>
+        <a:font script="Taml" typeface="Latha"/>
+        <a:font script="Syrc" typeface="Estrangelo Edessa"/>
+        <a:font script="Orya" typeface="Kalinga"/>
+        <a:font script="Mlym" typeface="Kartika"/>
+        <a:font script="Laoo" typeface="DokChampa"/>
+        <a:font script="Sinh" typeface="Iskoola Pota"/>
+        <a:font script="Mong" typeface="Mongolian Baiti"/>
+        <a:font script="Viet" typeface="Times New Roman"/>
+        <a:font script="Uigh" typeface="Microsoft Uighur"/>
+        <a:font script="Geor" typeface="Sylfaen"/>
+        <a:font script="Armn" typeface="Arial"/>
+        <a:font script="Bugi" typeface="Leelawadee UI"/>
+        <a:font script="Bopo" typeface="Microsoft JhengHei"/>
+        <a:font script="Java" typeface="Javanese Text"/>
+        <a:font script="Lisu" typeface="Segoe UI"/>
+        <a:font script="Mymr" typeface="Myanmar Text"/>
+        <a:font script="Nkoo" typeface="Ebrima"/>
+        <a:font script="Olck" typeface="Nirmala UI"/>
+        <a:font script="Osma" typeface="Ebrima"/>
+        <a:font script="Phag" typeface="Phagspa"/>
+        <a:font script="Syrn" typeface="Estrangelo Edessa"/>
+        <a:font script="Syrj" typeface="Estrangelo Edessa"/>
+        <a:font script="Syre" typeface="Estrangelo Edessa"/>
+        <a:font script="Sora" typeface="Nirmala UI"/>
+        <a:font script="Tale" typeface="Microsoft Tai Le"/>
+        <a:font script="Talu" typeface="Microsoft New Tai Lue"/>
+        <a:font script="Tfng" typeface="Ebrima"/>
+      </a:majorFont>
+      <a:minorFont>
+        <a:latin typeface="Calibri" panose="020F0502020204030204"/>
+        <a:ea typeface=""/>
+        <a:cs typeface=""/>
+        <a:font script="Jpan" typeface="游ゴシック"/>
+        <a:font script="Hang" typeface="맑은 고딕"/>
+        <a:font script="Hans" typeface="等线"/>
+        <a:font script="Hant" typeface="新細明體"/>
+        <a:font script="Arab" typeface="Arial"/>
+        <a:font script="Hebr" typeface="Arial"/>
+        <a:font script="Thai" typeface="Cordia New"/>
+        <a:font script="Ethi" typeface="Nyala"/>
+        <a:font script="Beng" typeface="Vrinda"/>
+        <a:font script="Gujr" typeface="Shruti"/>
+        <a:font script="Khmr" typeface="DaunPenh"/>
+        <a:font script="Knda" typeface="Tunga"/>
+        <a:font script="Guru" typeface="Raavi"/>
+        <a:font script="Cans" typeface="Euphemia"/>
+        <a:font script="Cher" typeface="Plantagenet Cherokee"/>
+        <a:font script="Yiii" typeface="Microsoft Yi Baiti"/>
+        <a:font script="Tibt" typeface="Microsoft Himalaya"/>
+        <a:font script="Thaa" typeface="MV Boli"/>
+        <a:font script="Deva" typeface="Mangal"/>
+        <a:font script="Telu" typeface="Gautami"/>
+        <a:font script="Taml" typeface="Latha"/>
+        <a:font script="Syrc" typeface="Estrangelo Edessa"/>
+        <a:font script="Orya" typeface="Kalinga"/>
+        <a:font script="Mlym" typeface="Kartika"/>
+        <a:font script="Laoo" typeface="DokChampa"/>
+        <a:font script="Sinh" typeface="Iskoola Pota"/>
+        <a:font script="Mong" typeface="Mongolian Baiti"/>
+        <a:font script="Viet" typeface="Arial"/>
+        <a:font script="Uigh" typeface="Microsoft Uighur"/>
+        <a:font script="Geor" typeface="Sylfaen"/>
+        <a:font script="Armn" typeface="Arial"/>
+        <a:font script="Bugi" typeface="Leelawadee UI"/>
+        <a:font script="Bopo" typeface="Microsoft JhengHei"/>
+        <a:font script="Java" typeface="Javanese Text"/>
+        <a:font script="Lisu" typeface="Segoe UI"/>
+        <a:font script="Mymr" typeface="Myanmar Text"/>
+        <a:font script="Nkoo" typeface="Ebrima"/>
+        <a:font script="Olck" typeface="Nirmala UI"/>
+        <a:font script="Osma" typeface="Ebrima"/>
+        <a:font script="Phag" typeface="Phagspa"/>
+        <a:font script="Syrn" typeface="Estrangelo Edessa"/>
+        <a:font script="Syrj" typeface="Estrangelo Edessa"/>
+        <a:font script="Syre" typeface="Estrangelo Edessa"/>
+        <a:font script="Sora" typeface="Nirmala UI"/>
+        <a:font script="Tale" typeface="Microsoft Tai Le"/>
+        <a:font script="Talu" typeface="Microsoft New Tai Lue"/>
+        <a:font script="Tfng" typeface="Ebrima"/>
+      </a:minorFont>
+    </a:fontScheme>
+    <a:fmtScheme name="Office">
+      <a:fillStyleLst>
+        <a:solidFill>
+          <a:schemeClr val="phClr"/>
+        </a:solidFill>
+        <a:gradFill rotWithShape="1">
+          <a:gsLst>
+            <a:gs pos="0">
+              <a:schemeClr val="phClr">
+                <a:lumMod val="110000"/>
+                <a:satMod val="105000"/>
+                <a:tint val="67000"/>
+              </a:schemeClr>
+            </a:gs>
+            <a:gs pos="50000">
+              <a:schemeClr val="phClr">
+                <a:lumMod val="105000"/>
+                <a:satMod val="103000"/>
+                <a:tint val="73000"/>
+              </a:schemeClr>
+            </a:gs>
+            <a:gs pos="100000">
+              <a:schemeClr val="phClr">
+                <a:lumMod val="105000"/>
+                <a:satMod val="109000"/>
+                <a:tint val="81000"/>
+              </a:schemeClr>
+            </a:gs>
+          </a:gsLst>
+          <a:lin ang="5400000" scaled="0"/>
+        </a:gradFill>
+        <a:gradFill rotWithShape="1">
+          <a:gsLst>
+            <a:gs pos="0">
+              <a:schemeClr val="phClr">
+                <a:satMod val="103000"/>
+                <a:lumMod val="102000"/>
+                <a:tint val="94000"/>
+              </a:schemeClr>
+            </a:gs>
+            <a:gs pos="50000">
+              <a:schemeClr val="phClr">
+                <a:satMod val="110000"/>
+                <a:lumMod val="100000"/>
+                <a:shade val="100000"/>
+              </a:schemeClr>
+            </a:gs>
+            <a:gs pos="100000">
+              <a:schemeClr val="phClr">
+                <a:lumMod val="99000"/>
+                <a:satMod val="120000"/>
+                <a:shade val="78000"/>
+              </a:schemeClr>
+            </a:gs>
+          </a:gsLst>
+          <a:lin ang="5400000" scaled="0"/>
+        </a:gradFill>
+      </a:fillStyleLst>
+      <a:lnStyleLst>
+        <a:ln w="6350" cap="flat" cmpd="sng" algn="ctr">
+          <a:solidFill>
+            <a:schemeClr val="phClr"/>
+          </a:solidFill>
+          <a:prstDash val="solid"/>
+          <a:miter lim="800000"/>
+        </a:ln>
+        <a:ln w="12700" cap="flat" cmpd="sng" algn="ctr">
+          <a:solidFill>
+            <a:schemeClr val="phClr"/>
+          </a:solidFill>
+          <a:prstDash val="solid"/>
+          <a:miter lim="800000"/>
+        </a:ln>
+        <a:ln w="19050" cap="flat" cmpd="sng" algn="ctr">
+          <a:solidFill>
+            <a:schemeClr val="phClr"/>
+          </a:solidFill>
+          <a:prstDash val="solid"/>
+          <a:miter lim="800000"/>
+        </a:ln>
+      </a:lnStyleLst>
+      <a:effectStyleLst>
+        <a:effectStyle>
+          <a:effectLst/>
+        </a:effectStyle>
+        <a:effectStyle>
+          <a:effectLst/>
+        </a:effectStyle>
+        <a:effectStyle>
+          <a:effectLst>
+            <a:outerShdw blurRad="57150" dist="19050" dir="5400000" algn="ctr" rotWithShape="0">
+              <a:srgbClr val="000000">
+                <a:alpha val="63000"/>
+              </a:srgbClr>
+            </a:outerShdw>
+          </a:effectLst>
+        </a:effectStyle>
+      </a:effectStyleLst>
+      <a:bgFillStyleLst>
+        <a:solidFill>
+          <a:schemeClr val="phClr"/>
+        </a:solidFill>
+        <a:solidFill>
+          <a:schemeClr val="phClr">
+            <a:tint val="95000"/>
+            <a:satMod val="170000"/>
+          </a:schemeClr>
+        </a:solidFill>
+        <a:gradFill rotWithShape="1">
+          <a:gsLst>
+            <a:gs pos="0">
+              <a:schemeClr val="phClr">
+                <a:tint val="93000"/>
+                <a:satMod val="150000"/>
+                <a:shade val="98000"/>
+                <a:lumMod val="102000"/>
+              </a:schemeClr>
+            </a:gs>
+            <a:gs pos="50000">
+              <a:schemeClr val="phClr">
+                <a:tint val="98000"/>
+                <a:satMod val="130000"/>
+                <a:shade val="90000"/>
+                <a:lumMod val="103000"/>
+              </a:schemeClr>
+            </a:gs>
+            <a:gs pos="100000">
+              <a:schemeClr val="phClr">
+                <a:shade val="63000"/>
+                <a:satMod val="120000"/>
+              </a:schemeClr>
+            </a:gs>
+          </a:gsLst>
+          <a:lin ang="5400000" scaled="0"/>
+        </a:gradFill>
+      </a:bgFillStyleLst>
+    </a:fmtScheme>
+  </a:themeElements>
+  <a:objectDefaults/>
+  <a:extraClrSchemeLst/>
+  <a:extLst>
+    <a:ext uri="{05A4C25C-085E-4340-85A3-A5531E510DB2}">
+      <thm15:themeFamily xmlns:thm15="http://schemas.microsoft.com/office/thememl/2012/main" name="Office Theme" id="{62F939B6-93AF-4DB8-9C6B-D6C7DFDC589F}" vid="{4A3C46E8-61CC-4603-A589-7422A47A8E4A}"/>
+    </a:ext>
+  </a:extLst>
+</a:theme>
 </file>
</xml_diff>